<commit_message>
Updated final versions of talk - link
</commit_message>
<xml_diff>
--- a/hpo_on_biowulf_using_candle-2021-01-19.pptx
+++ b/hpo_on_biowulf_using_candle-2021-01-19.pptx
@@ -280,7 +280,7 @@
 <file path=ppt/revisionInfo.xml><?xml version="1.0" encoding="utf-8"?>
 <p1510:revInfo xmlns:a="http://schemas.openxmlformats.org/drawingml/2006/main" xmlns:r="http://schemas.openxmlformats.org/officeDocument/2006/relationships" xmlns:p1510="http://schemas.microsoft.com/office/powerpoint/2015/10/main">
   <p1510:revLst>
-    <p1510:client id="{5ABF795C-0190-41B1-85B3-B75C45E34628}" v="1017" dt="2021-01-19T09:51:32.854"/>
+    <p1510:client id="{5ABF795C-0190-41B1-85B3-B75C45E34628}" v="1018" dt="2021-01-19T09:58:32.884"/>
   </p1510:revLst>
 </p1510:revInfo>
 </file>
@@ -26868,8 +26868,8 @@
           </a:p>
         </p:txBody>
       </p:sp>
-      <mc:AlternateContent xmlns:mc="http://schemas.openxmlformats.org/markup-compatibility/2006">
-        <mc:Choice xmlns:a14="http://schemas.microsoft.com/office/drawing/2010/main" Requires="a14">
+      <mc:AlternateContent xmlns:mc="http://schemas.openxmlformats.org/markup-compatibility/2006" xmlns:a14="http://schemas.microsoft.com/office/drawing/2010/main">
+        <mc:Choice Requires="a14">
           <p:sp>
             <p:nvSpPr>
               <p:cNvPr id="7171" name="Rectangle 3"/>
@@ -27224,7 +27224,7 @@
             </p:txBody>
           </p:sp>
         </mc:Choice>
-        <mc:Fallback>
+        <mc:Fallback xmlns="">
           <p:sp>
             <p:nvSpPr>
               <p:cNvPr id="7171" name="Rectangle 3"/>
@@ -30981,8 +30981,8 @@
           </a:p>
         </p:txBody>
       </p:sp>
-      <mc:AlternateContent xmlns:mc="http://schemas.openxmlformats.org/markup-compatibility/2006">
-        <mc:Choice xmlns:a14="http://schemas.microsoft.com/office/drawing/2010/main" Requires="a14">
+      <mc:AlternateContent xmlns:mc="http://schemas.openxmlformats.org/markup-compatibility/2006" xmlns:a14="http://schemas.microsoft.com/office/drawing/2010/main">
+        <mc:Choice Requires="a14">
           <p:sp>
             <p:nvSpPr>
               <p:cNvPr id="7171" name="Rectangle 3"/>
@@ -31412,7 +31412,7 @@
             </p:txBody>
           </p:sp>
         </mc:Choice>
-        <mc:Fallback>
+        <mc:Fallback xmlns="">
           <p:sp>
             <p:nvSpPr>
               <p:cNvPr id="7171" name="Rectangle 3"/>
@@ -32418,8 +32418,8 @@
           </a:p>
         </p:txBody>
       </p:sp>
-      <mc:AlternateContent xmlns:mc="http://schemas.openxmlformats.org/markup-compatibility/2006">
-        <mc:Choice xmlns:a14="http://schemas.microsoft.com/office/drawing/2010/main" Requires="a14">
+      <mc:AlternateContent xmlns:mc="http://schemas.openxmlformats.org/markup-compatibility/2006" xmlns:a14="http://schemas.microsoft.com/office/drawing/2010/main">
+        <mc:Choice Requires="a14">
           <p:sp>
             <p:nvSpPr>
               <p:cNvPr id="7171" name="Rectangle 3"/>
@@ -32875,7 +32875,7 @@
             </p:txBody>
           </p:sp>
         </mc:Choice>
-        <mc:Fallback>
+        <mc:Fallback xmlns="">
           <p:sp>
             <p:nvSpPr>
               <p:cNvPr id="7171" name="Rectangle 3"/>

</xml_diff>